<commit_message>
added knowledge on GCP
</commit_message>
<xml_diff>
--- a/[GCP_Coursera].pptx
+++ b/[GCP_Coursera].pptx
@@ -5,7 +5,7 @@
     <p:sldMasterId id="2147483648" r:id="rId1"/>
   </p:sldMasterIdLst>
   <p:notesMasterIdLst>
-    <p:notesMasterId r:id="rId14"/>
+    <p:notesMasterId r:id="rId17"/>
   </p:notesMasterIdLst>
   <p:sldIdLst>
     <p:sldId id="257" r:id="rId2"/>
@@ -19,7 +19,10 @@
     <p:sldId id="265" r:id="rId10"/>
     <p:sldId id="266" r:id="rId11"/>
     <p:sldId id="267" r:id="rId12"/>
-    <p:sldId id="262" r:id="rId13"/>
+    <p:sldId id="268" r:id="rId13"/>
+    <p:sldId id="269" r:id="rId14"/>
+    <p:sldId id="270" r:id="rId15"/>
+    <p:sldId id="262" r:id="rId16"/>
   </p:sldIdLst>
   <p:sldSz cx="12192000" cy="6858000"/>
   <p:notesSz cx="6858000" cy="9144000"/>
@@ -208,7 +211,7 @@
           <a:p>
             <a:fld id="{C4DE4319-DF9C-4731-8DE1-86EDE955981F}" type="datetimeFigureOut">
               <a:rPr lang="en-US" smtClean="0"/>
-              <a:t>4/28/2018</a:t>
+              <a:t>4/30/18</a:t>
             </a:fld>
             <a:endParaRPr lang="en-US"/>
           </a:p>
@@ -706,7 +709,7 @@
           <a:p>
             <a:fld id="{1D6CD7E0-B931-4979-8A7A-C1EA506FDDF5}" type="datetimeFigureOut">
               <a:rPr lang="en-US" smtClean="0"/>
-              <a:t>4/28/2018</a:t>
+              <a:t>4/30/18</a:t>
             </a:fld>
             <a:endParaRPr lang="en-US"/>
           </a:p>
@@ -904,7 +907,7 @@
           <a:p>
             <a:fld id="{1D6CD7E0-B931-4979-8A7A-C1EA506FDDF5}" type="datetimeFigureOut">
               <a:rPr lang="en-US" smtClean="0"/>
-              <a:t>4/28/2018</a:t>
+              <a:t>4/30/18</a:t>
             </a:fld>
             <a:endParaRPr lang="en-US"/>
           </a:p>
@@ -1112,7 +1115,7 @@
           <a:p>
             <a:fld id="{1D6CD7E0-B931-4979-8A7A-C1EA506FDDF5}" type="datetimeFigureOut">
               <a:rPr lang="en-US" smtClean="0"/>
-              <a:t>4/28/2018</a:t>
+              <a:t>4/30/18</a:t>
             </a:fld>
             <a:endParaRPr lang="en-US"/>
           </a:p>
@@ -1310,7 +1313,7 @@
           <a:p>
             <a:fld id="{1D6CD7E0-B931-4979-8A7A-C1EA506FDDF5}" type="datetimeFigureOut">
               <a:rPr lang="en-US" smtClean="0"/>
-              <a:t>4/28/2018</a:t>
+              <a:t>4/30/18</a:t>
             </a:fld>
             <a:endParaRPr lang="en-US"/>
           </a:p>
@@ -1585,7 +1588,7 @@
           <a:p>
             <a:fld id="{1D6CD7E0-B931-4979-8A7A-C1EA506FDDF5}" type="datetimeFigureOut">
               <a:rPr lang="en-US" smtClean="0"/>
-              <a:t>4/28/2018</a:t>
+              <a:t>4/30/18</a:t>
             </a:fld>
             <a:endParaRPr lang="en-US"/>
           </a:p>
@@ -1850,7 +1853,7 @@
           <a:p>
             <a:fld id="{1D6CD7E0-B931-4979-8A7A-C1EA506FDDF5}" type="datetimeFigureOut">
               <a:rPr lang="en-US" smtClean="0"/>
-              <a:t>4/28/2018</a:t>
+              <a:t>4/30/18</a:t>
             </a:fld>
             <a:endParaRPr lang="en-US"/>
           </a:p>
@@ -2262,7 +2265,7 @@
           <a:p>
             <a:fld id="{1D6CD7E0-B931-4979-8A7A-C1EA506FDDF5}" type="datetimeFigureOut">
               <a:rPr lang="en-US" smtClean="0"/>
-              <a:t>4/28/2018</a:t>
+              <a:t>4/30/18</a:t>
             </a:fld>
             <a:endParaRPr lang="en-US"/>
           </a:p>
@@ -2403,7 +2406,7 @@
           <a:p>
             <a:fld id="{1D6CD7E0-B931-4979-8A7A-C1EA506FDDF5}" type="datetimeFigureOut">
               <a:rPr lang="en-US" smtClean="0"/>
-              <a:t>4/28/2018</a:t>
+              <a:t>4/30/18</a:t>
             </a:fld>
             <a:endParaRPr lang="en-US"/>
           </a:p>
@@ -2516,7 +2519,7 @@
           <a:p>
             <a:fld id="{1D6CD7E0-B931-4979-8A7A-C1EA506FDDF5}" type="datetimeFigureOut">
               <a:rPr lang="en-US" smtClean="0"/>
-              <a:t>4/28/2018</a:t>
+              <a:t>4/30/18</a:t>
             </a:fld>
             <a:endParaRPr lang="en-US"/>
           </a:p>
@@ -2827,7 +2830,7 @@
           <a:p>
             <a:fld id="{1D6CD7E0-B931-4979-8A7A-C1EA506FDDF5}" type="datetimeFigureOut">
               <a:rPr lang="en-US" smtClean="0"/>
-              <a:t>4/28/2018</a:t>
+              <a:t>4/30/18</a:t>
             </a:fld>
             <a:endParaRPr lang="en-US"/>
           </a:p>
@@ -3115,7 +3118,7 @@
           <a:p>
             <a:fld id="{1D6CD7E0-B931-4979-8A7A-C1EA506FDDF5}" type="datetimeFigureOut">
               <a:rPr lang="en-US" smtClean="0"/>
-              <a:t>4/28/2018</a:t>
+              <a:t>4/30/18</a:t>
             </a:fld>
             <a:endParaRPr lang="en-US"/>
           </a:p>
@@ -3356,7 +3359,7 @@
           <a:p>
             <a:fld id="{1D6CD7E0-B931-4979-8A7A-C1EA506FDDF5}" type="datetimeFigureOut">
               <a:rPr lang="en-US" smtClean="0"/>
-              <a:t>4/28/2018</a:t>
+              <a:t>4/30/18</a:t>
             </a:fld>
             <a:endParaRPr lang="en-US"/>
           </a:p>
@@ -4398,7 +4401,7 @@
           <a:p>
             <a:r>
               <a:rPr lang="en-US" dirty="0"/>
-              <a:t>2 interfaces GCP provides:</a:t>
+              <a:t>2 user interfaces GCP provides:</a:t>
             </a:r>
           </a:p>
           <a:p>
@@ -4453,6 +4456,1094 @@
 </file>
 
 <file path=ppt/slides/slide12.xml><?xml version="1.0" encoding="utf-8"?>
+<p:sld xmlns:a="http://schemas.openxmlformats.org/drawingml/2006/main" xmlns:r="http://schemas.openxmlformats.org/officeDocument/2006/relationships" xmlns:p="http://schemas.openxmlformats.org/presentationml/2006/main">
+  <p:cSld>
+    <p:spTree>
+      <p:nvGrpSpPr>
+        <p:cNvPr id="1" name=""/>
+        <p:cNvGrpSpPr/>
+        <p:nvPr/>
+      </p:nvGrpSpPr>
+      <p:grpSpPr>
+        <a:xfrm>
+          <a:off x="0" y="0"/>
+          <a:ext cx="0" cy="0"/>
+          <a:chOff x="0" y="0"/>
+          <a:chExt cx="0" cy="0"/>
+        </a:xfrm>
+      </p:grpSpPr>
+      <p:sp>
+        <p:nvSpPr>
+          <p:cNvPr id="5" name="TextBox 4">
+            <a:extLst>
+              <a:ext uri="{FF2B5EF4-FFF2-40B4-BE49-F238E27FC236}">
+                <a16:creationId xmlns:a16="http://schemas.microsoft.com/office/drawing/2014/main" id="{8DD99D7E-068F-5343-86C5-D309258BE143}"/>
+              </a:ext>
+            </a:extLst>
+          </p:cNvPr>
+          <p:cNvSpPr txBox="1"/>
+          <p:nvPr/>
+        </p:nvSpPr>
+        <p:spPr>
+          <a:xfrm>
+            <a:off x="0" y="0"/>
+            <a:ext cx="4555734" cy="646331"/>
+          </a:xfrm>
+          <a:prstGeom prst="rect">
+            <a:avLst/>
+          </a:prstGeom>
+          <a:noFill/>
+        </p:spPr>
+        <p:txBody>
+          <a:bodyPr wrap="none" rtlCol="0">
+            <a:spAutoFit/>
+          </a:bodyPr>
+          <a:lstStyle/>
+          <a:p>
+            <a:r>
+              <a:rPr lang="en-US" dirty="0"/>
+              <a:t>Firewalls</a:t>
+            </a:r>
+          </a:p>
+          <a:p>
+            <a:pPr marL="285750" indent="-285750">
+              <a:buFont typeface="Arial" panose="020B0604020202020204" pitchFamily="34" charset="0"/>
+              <a:buChar char="•"/>
+            </a:pPr>
+            <a:r>
+              <a:rPr lang="ja-JP" altLang="en-US"/>
+              <a:t>不只是</a:t>
+            </a:r>
+            <a:r>
+              <a:rPr lang="en-US" altLang="ja-JP" dirty="0"/>
+              <a:t>GCP</a:t>
+            </a:r>
+            <a:r>
+              <a:rPr lang="zh-Hans" altLang="en-US" dirty="0"/>
+              <a:t>，</a:t>
+            </a:r>
+            <a:r>
+              <a:rPr lang="ja-JP" altLang="en-US"/>
+              <a:t>下图知识适用于所有</a:t>
+            </a:r>
+            <a:r>
+              <a:rPr lang="en-US" altLang="ja-JP" dirty="0"/>
+              <a:t>firewall</a:t>
+            </a:r>
+            <a:endParaRPr lang="en-US" dirty="0"/>
+          </a:p>
+        </p:txBody>
+      </p:sp>
+      <p:pic>
+        <p:nvPicPr>
+          <p:cNvPr id="7" name="Picture 6">
+            <a:extLst>
+              <a:ext uri="{FF2B5EF4-FFF2-40B4-BE49-F238E27FC236}">
+                <a16:creationId xmlns:a16="http://schemas.microsoft.com/office/drawing/2014/main" id="{A7E47FE6-D953-AA47-96BB-A630BC92C1AD}"/>
+              </a:ext>
+            </a:extLst>
+          </p:cNvPr>
+          <p:cNvPicPr>
+            <a:picLocks noChangeAspect="1"/>
+          </p:cNvPicPr>
+          <p:nvPr/>
+        </p:nvPicPr>
+        <p:blipFill>
+          <a:blip r:embed="rId2">
+            <a:extLst>
+              <a:ext uri="{28A0092B-C50C-407E-A947-70E740481C1C}">
+                <a14:useLocalDpi xmlns:a14="http://schemas.microsoft.com/office/drawing/2010/main" val="0"/>
+              </a:ext>
+            </a:extLst>
+          </a:blip>
+          <a:stretch>
+            <a:fillRect/>
+          </a:stretch>
+        </p:blipFill>
+        <p:spPr>
+          <a:xfrm>
+            <a:off x="0" y="646331"/>
+            <a:ext cx="8772950" cy="4536440"/>
+          </a:xfrm>
+          <a:prstGeom prst="rect">
+            <a:avLst/>
+          </a:prstGeom>
+        </p:spPr>
+      </p:pic>
+    </p:spTree>
+    <p:extLst>
+      <p:ext uri="{BB962C8B-B14F-4D97-AF65-F5344CB8AC3E}">
+        <p14:creationId xmlns:p14="http://schemas.microsoft.com/office/powerpoint/2010/main" val="2515874811"/>
+      </p:ext>
+    </p:extLst>
+  </p:cSld>
+  <p:clrMapOvr>
+    <a:masterClrMapping/>
+  </p:clrMapOvr>
+</p:sld>
+</file>
+
+<file path=ppt/slides/slide13.xml><?xml version="1.0" encoding="utf-8"?>
+<p:sld xmlns:a="http://schemas.openxmlformats.org/drawingml/2006/main" xmlns:r="http://schemas.openxmlformats.org/officeDocument/2006/relationships" xmlns:p="http://schemas.openxmlformats.org/presentationml/2006/main">
+  <p:cSld>
+    <p:spTree>
+      <p:nvGrpSpPr>
+        <p:cNvPr id="1" name=""/>
+        <p:cNvGrpSpPr/>
+        <p:nvPr/>
+      </p:nvGrpSpPr>
+      <p:grpSpPr>
+        <a:xfrm>
+          <a:off x="0" y="0"/>
+          <a:ext cx="0" cy="0"/>
+          <a:chOff x="0" y="0"/>
+          <a:chExt cx="0" cy="0"/>
+        </a:xfrm>
+      </p:grpSpPr>
+      <p:sp>
+        <p:nvSpPr>
+          <p:cNvPr id="5" name="TextBox 4">
+            <a:extLst>
+              <a:ext uri="{FF2B5EF4-FFF2-40B4-BE49-F238E27FC236}">
+                <a16:creationId xmlns:a16="http://schemas.microsoft.com/office/drawing/2014/main" id="{BC40B3EC-A381-DC41-AEAE-635484D1F3E9}"/>
+              </a:ext>
+            </a:extLst>
+          </p:cNvPr>
+          <p:cNvSpPr txBox="1"/>
+          <p:nvPr/>
+        </p:nvSpPr>
+        <p:spPr>
+          <a:xfrm>
+            <a:off x="0" y="0"/>
+            <a:ext cx="7125970" cy="3693319"/>
+          </a:xfrm>
+          <a:prstGeom prst="rect">
+            <a:avLst/>
+          </a:prstGeom>
+          <a:noFill/>
+        </p:spPr>
+        <p:txBody>
+          <a:bodyPr wrap="square" rtlCol="0">
+            <a:spAutoFit/>
+          </a:bodyPr>
+          <a:lstStyle/>
+          <a:p>
+            <a:r>
+              <a:rPr lang="en-US" altLang="ja-JP" dirty="0"/>
+              <a:t>GCP</a:t>
+            </a:r>
+            <a:r>
+              <a:rPr lang="ja-JP" altLang="en-US"/>
+              <a:t>设定里有</a:t>
+            </a:r>
+            <a:r>
+              <a:rPr lang="en-US" altLang="zh-Hans" dirty="0"/>
+              <a:t>3</a:t>
+            </a:r>
+            <a:r>
+              <a:rPr lang="ja-JP" altLang="en-US"/>
+              <a:t>种</a:t>
+            </a:r>
+            <a:r>
+              <a:rPr lang="en-US" altLang="ja-JP" dirty="0"/>
+              <a:t>network</a:t>
+            </a:r>
+            <a:r>
+              <a:rPr lang="zh-Hans" altLang="en-US" dirty="0"/>
+              <a:t> </a:t>
+            </a:r>
+            <a:r>
+              <a:rPr lang="en-US" altLang="zh-Hans" dirty="0"/>
+              <a:t>type</a:t>
+            </a:r>
+            <a:r>
+              <a:rPr lang="zh-Hans" altLang="en-US" dirty="0"/>
+              <a:t>：</a:t>
+            </a:r>
+            <a:r>
+              <a:rPr lang="en-US" altLang="zh-Hans" dirty="0"/>
+              <a:t>default</a:t>
+            </a:r>
+            <a:r>
+              <a:rPr lang="zh-Hans" altLang="en-US" dirty="0"/>
+              <a:t>、</a:t>
+            </a:r>
+            <a:r>
+              <a:rPr lang="en-US" altLang="zh-Hans" dirty="0"/>
+              <a:t>auto</a:t>
+            </a:r>
+            <a:r>
+              <a:rPr lang="zh-Hans" altLang="en-US" dirty="0"/>
+              <a:t>、</a:t>
+            </a:r>
+            <a:r>
+              <a:rPr lang="en-US" altLang="zh-Hans" dirty="0"/>
+              <a:t>custom</a:t>
+            </a:r>
+            <a:endParaRPr lang="en-US" altLang="ja-JP" dirty="0"/>
+          </a:p>
+          <a:p>
+            <a:r>
+              <a:rPr lang="ja-JP" altLang="en-US"/>
+              <a:t>几种</a:t>
+            </a:r>
+            <a:r>
+              <a:rPr lang="en-US" altLang="ja-JP" dirty="0"/>
+              <a:t>network</a:t>
+            </a:r>
+            <a:r>
+              <a:rPr lang="zh-Hans" altLang="en-US" dirty="0"/>
+              <a:t> </a:t>
+            </a:r>
+            <a:r>
+              <a:rPr lang="en-US" altLang="zh-Hans" dirty="0"/>
+              <a:t>design</a:t>
+            </a:r>
+            <a:r>
+              <a:rPr lang="ja-JP" altLang="en-US"/>
+              <a:t>以及其好处</a:t>
+            </a:r>
+            <a:endParaRPr lang="en-US" altLang="ja-JP" dirty="0"/>
+          </a:p>
+          <a:p>
+            <a:pPr marL="285750" indent="-285750">
+              <a:buFont typeface="Arial" panose="020B0604020202020204" pitchFamily="34" charset="0"/>
+              <a:buChar char="•"/>
+            </a:pPr>
+            <a:r>
+              <a:rPr lang="en-US" dirty="0"/>
+              <a:t>Globalization</a:t>
+            </a:r>
+            <a:r>
+              <a:rPr lang="ja-JP" altLang="en-US"/>
+              <a:t>型的</a:t>
+            </a:r>
+            <a:r>
+              <a:rPr lang="en-US" altLang="ja-JP" dirty="0"/>
+              <a:t>design</a:t>
+            </a:r>
+            <a:r>
+              <a:rPr lang="ja-JP" altLang="en-US"/>
+              <a:t>比</a:t>
+            </a:r>
+            <a:r>
+              <a:rPr lang="en-US" altLang="ja-JP" dirty="0"/>
+              <a:t>availability</a:t>
+            </a:r>
+            <a:r>
+              <a:rPr lang="ja-JP" altLang="en-US"/>
+              <a:t>型有更高的</a:t>
+            </a:r>
+            <a:r>
+              <a:rPr lang="en-US" altLang="ja-JP" dirty="0"/>
+              <a:t>failure</a:t>
+            </a:r>
+            <a:r>
+              <a:rPr lang="zh-Hans" altLang="en-US" dirty="0"/>
+              <a:t> </a:t>
+            </a:r>
+            <a:r>
+              <a:rPr lang="en-US" altLang="zh-Hans" dirty="0"/>
+              <a:t>robustness</a:t>
+            </a:r>
+            <a:r>
+              <a:rPr lang="zh-Hans" altLang="en-US" dirty="0"/>
+              <a:t>，</a:t>
+            </a:r>
+            <a:r>
+              <a:rPr lang="ja-JP" altLang="en-US"/>
+              <a:t>但是</a:t>
+            </a:r>
+            <a:r>
+              <a:rPr lang="en-US" altLang="ja-JP" dirty="0"/>
+              <a:t>security</a:t>
+            </a:r>
+            <a:r>
+              <a:rPr lang="ja-JP" altLang="en-US"/>
+              <a:t>会变复杂</a:t>
+            </a:r>
+            <a:endParaRPr lang="en-US" altLang="ja-JP" dirty="0"/>
+          </a:p>
+          <a:p>
+            <a:pPr marL="285750" indent="-285750">
+              <a:buFont typeface="Arial" panose="020B0604020202020204" pitchFamily="34" charset="0"/>
+              <a:buChar char="•"/>
+            </a:pPr>
+            <a:r>
+              <a:rPr lang="ja-JP" altLang="en-US"/>
+              <a:t>第三种</a:t>
+            </a:r>
+            <a:r>
+              <a:rPr lang="en-US" altLang="ja-JP" dirty="0"/>
+              <a:t>cross</a:t>
+            </a:r>
+            <a:r>
+              <a:rPr lang="en-US" altLang="zh-Hans" dirty="0"/>
+              <a:t>-project</a:t>
+            </a:r>
+            <a:r>
+              <a:rPr lang="zh-Hans" altLang="en-US" dirty="0"/>
+              <a:t> </a:t>
+            </a:r>
+            <a:r>
+              <a:rPr lang="en-US" altLang="zh-Hans" dirty="0"/>
+              <a:t>VPC</a:t>
+            </a:r>
+            <a:r>
+              <a:rPr lang="zh-Hans" altLang="en-US" dirty="0"/>
+              <a:t>，</a:t>
+            </a:r>
+            <a:r>
+              <a:rPr lang="ja-JP" altLang="en-US"/>
+              <a:t>这种设计能确保一个</a:t>
+            </a:r>
+            <a:r>
+              <a:rPr lang="en-US" altLang="ja-JP" dirty="0"/>
+              <a:t>project</a:t>
+            </a:r>
+            <a:r>
+              <a:rPr lang="ja-JP" altLang="en-US"/>
+              <a:t>的</a:t>
+            </a:r>
+            <a:r>
+              <a:rPr lang="en-US" altLang="ja-JP" dirty="0"/>
+              <a:t>failure</a:t>
+            </a:r>
+            <a:r>
+              <a:rPr lang="ja-JP" altLang="en-US"/>
+              <a:t>不影响另一方</a:t>
+            </a:r>
+            <a:endParaRPr lang="en-US" altLang="ja-JP" dirty="0"/>
+          </a:p>
+          <a:p>
+            <a:pPr marL="285750" indent="-285750">
+              <a:buFont typeface="Arial" panose="020B0604020202020204" pitchFamily="34" charset="0"/>
+              <a:buChar char="•"/>
+            </a:pPr>
+            <a:r>
+              <a:rPr lang="ja-JP" altLang="en-US"/>
+              <a:t>第四种</a:t>
+            </a:r>
+            <a:r>
+              <a:rPr lang="zh-Hans" altLang="en-US" dirty="0"/>
+              <a:t>，</a:t>
+            </a:r>
+            <a:r>
+              <a:rPr lang="en-US" altLang="zh-Hans" dirty="0"/>
+              <a:t>management</a:t>
+            </a:r>
+            <a:r>
+              <a:rPr lang="zh-Hans" altLang="en-US" dirty="0"/>
+              <a:t> </a:t>
+            </a:r>
+            <a:r>
+              <a:rPr lang="en-US" altLang="zh-Hans" dirty="0"/>
+              <a:t>separation</a:t>
+            </a:r>
+            <a:r>
+              <a:rPr lang="zh-Hans" altLang="en-US" dirty="0"/>
+              <a:t> </a:t>
+            </a:r>
+            <a:r>
+              <a:rPr lang="en-US" altLang="ja-JP" dirty="0"/>
+              <a:t>is</a:t>
+            </a:r>
+            <a:r>
+              <a:rPr lang="zh-Hans" altLang="en-US" dirty="0"/>
+              <a:t> </a:t>
+            </a:r>
+            <a:r>
+              <a:rPr lang="en-US" altLang="zh-Hans" dirty="0"/>
+              <a:t>better</a:t>
+            </a:r>
+            <a:r>
+              <a:rPr lang="zh-Hans" altLang="en-US" dirty="0"/>
+              <a:t> </a:t>
+            </a:r>
+            <a:r>
+              <a:rPr lang="en-US" altLang="zh-Hans" dirty="0"/>
+              <a:t>for</a:t>
+            </a:r>
+            <a:r>
+              <a:rPr lang="zh-Hans" altLang="en-US" dirty="0"/>
+              <a:t> </a:t>
+            </a:r>
+            <a:r>
+              <a:rPr lang="en-US" altLang="zh-Hans" dirty="0"/>
+              <a:t>identity</a:t>
+            </a:r>
+            <a:r>
+              <a:rPr lang="zh-Hans" altLang="en-US" dirty="0"/>
+              <a:t> </a:t>
+            </a:r>
+            <a:r>
+              <a:rPr lang="en-US" altLang="zh-Hans" dirty="0"/>
+              <a:t>and</a:t>
+            </a:r>
+            <a:r>
+              <a:rPr lang="zh-Hans" altLang="en-US" dirty="0"/>
+              <a:t> </a:t>
+            </a:r>
+            <a:r>
+              <a:rPr lang="en-US" altLang="zh-Hans" dirty="0"/>
+              <a:t>access</a:t>
+            </a:r>
+            <a:r>
+              <a:rPr lang="zh-Hans" altLang="en-US" dirty="0"/>
+              <a:t> </a:t>
+            </a:r>
+            <a:r>
+              <a:rPr lang="en-US" altLang="zh-Hans" dirty="0"/>
+              <a:t>management</a:t>
+            </a:r>
+            <a:r>
+              <a:rPr lang="zh-Hans" altLang="en-US" dirty="0"/>
+              <a:t>，</a:t>
+            </a:r>
+            <a:r>
+              <a:rPr lang="ja-JP" altLang="en-US"/>
+              <a:t>比如说设计者属于</a:t>
+            </a:r>
+            <a:r>
+              <a:rPr lang="en-US" altLang="ja-JP" dirty="0"/>
+              <a:t>project</a:t>
+            </a:r>
+            <a:r>
+              <a:rPr lang="zh-Hans" altLang="en-US" dirty="0"/>
+              <a:t> </a:t>
+            </a:r>
+            <a:r>
+              <a:rPr lang="en-US" altLang="zh-Hans" dirty="0"/>
+              <a:t>1</a:t>
+            </a:r>
+            <a:r>
+              <a:rPr lang="zh-Hans" altLang="en-US" dirty="0"/>
+              <a:t>，</a:t>
+            </a:r>
+            <a:r>
+              <a:rPr lang="ja-JP" altLang="en-US"/>
+              <a:t>开发者属于</a:t>
+            </a:r>
+            <a:r>
+              <a:rPr lang="en-US" altLang="ja-JP" dirty="0"/>
+              <a:t>project</a:t>
+            </a:r>
+            <a:r>
+              <a:rPr lang="zh-Hans" altLang="en-US" dirty="0"/>
+              <a:t> </a:t>
+            </a:r>
+            <a:r>
+              <a:rPr lang="en-US" altLang="zh-Hans" dirty="0"/>
+              <a:t>2</a:t>
+            </a:r>
+          </a:p>
+          <a:p>
+            <a:pPr marL="285750" indent="-285750">
+              <a:buFont typeface="Arial" panose="020B0604020202020204" pitchFamily="34" charset="0"/>
+              <a:buChar char="•"/>
+            </a:pPr>
+            <a:r>
+              <a:rPr lang="ja-JP" altLang="en-US"/>
+              <a:t>第五种</a:t>
+            </a:r>
+            <a:r>
+              <a:rPr lang="zh-Hans" altLang="en-US" dirty="0"/>
+              <a:t>，</a:t>
+            </a:r>
+            <a:r>
+              <a:rPr lang="en-US" altLang="zh-Hans" dirty="0"/>
+              <a:t>NAT</a:t>
+            </a:r>
+            <a:r>
+              <a:rPr lang="zh-Hans" altLang="en-US" dirty="0"/>
+              <a:t> </a:t>
+            </a:r>
+            <a:r>
+              <a:rPr lang="en-US" altLang="zh-Hans" dirty="0"/>
+              <a:t>gateway</a:t>
+            </a:r>
+            <a:r>
+              <a:rPr lang="zh-Hans" altLang="en-US" dirty="0"/>
+              <a:t>（</a:t>
+            </a:r>
+            <a:r>
+              <a:rPr lang="ja-JP" altLang="en-US"/>
+              <a:t>也叫</a:t>
+            </a:r>
+            <a:r>
+              <a:rPr lang="en-US" altLang="ja-JP" dirty="0"/>
+              <a:t>bastion</a:t>
+            </a:r>
+            <a:r>
+              <a:rPr lang="zh-Hans" altLang="en-US" dirty="0"/>
+              <a:t>）</a:t>
+            </a:r>
+            <a:r>
+              <a:rPr lang="ja-JP" altLang="en-US"/>
+              <a:t>相当于一个</a:t>
+            </a:r>
+            <a:r>
+              <a:rPr lang="en-US" altLang="ja-JP" dirty="0"/>
+              <a:t>access</a:t>
+            </a:r>
+            <a:r>
+              <a:rPr lang="zh-Hans" altLang="en-US" dirty="0"/>
+              <a:t> </a:t>
+            </a:r>
+            <a:r>
+              <a:rPr lang="en-US" altLang="zh-Hans" dirty="0"/>
+              <a:t>proxy</a:t>
+            </a:r>
+            <a:r>
+              <a:rPr lang="zh-Hans" altLang="en-US" dirty="0"/>
+              <a:t>，</a:t>
+            </a:r>
+            <a:r>
+              <a:rPr lang="ja-JP" altLang="en-US"/>
+              <a:t>这个设计更安全</a:t>
+            </a:r>
+            <a:r>
+              <a:rPr lang="en-US" altLang="ja-JP" dirty="0"/>
+              <a:t>(</a:t>
+            </a:r>
+            <a:r>
+              <a:rPr lang="en-US" dirty="0"/>
+              <a:t>A best practice for infrastructure administration is to limit access to the resources. In this lab, you learn one method of hardening an infrastructure called a Bastion Host.</a:t>
+            </a:r>
+            <a:r>
+              <a:rPr lang="en-US" altLang="ja-JP" dirty="0"/>
+              <a:t>)</a:t>
+            </a:r>
+          </a:p>
+          <a:p>
+            <a:pPr marL="285750" indent="-285750">
+              <a:buFont typeface="Arial" panose="020B0604020202020204" pitchFamily="34" charset="0"/>
+              <a:buChar char="•"/>
+            </a:pPr>
+            <a:endParaRPr lang="en-US" dirty="0"/>
+          </a:p>
+        </p:txBody>
+      </p:sp>
+      <p:pic>
+        <p:nvPicPr>
+          <p:cNvPr id="7" name="Picture 6">
+            <a:extLst>
+              <a:ext uri="{FF2B5EF4-FFF2-40B4-BE49-F238E27FC236}">
+                <a16:creationId xmlns:a16="http://schemas.microsoft.com/office/drawing/2014/main" id="{36744A18-58B0-A446-BBF5-CF89C9973385}"/>
+              </a:ext>
+            </a:extLst>
+          </p:cNvPr>
+          <p:cNvPicPr>
+            <a:picLocks noChangeAspect="1"/>
+          </p:cNvPicPr>
+          <p:nvPr/>
+        </p:nvPicPr>
+        <p:blipFill>
+          <a:blip r:embed="rId2">
+            <a:extLst>
+              <a:ext uri="{28A0092B-C50C-407E-A947-70E740481C1C}">
+                <a14:useLocalDpi xmlns:a14="http://schemas.microsoft.com/office/drawing/2010/main" val="0"/>
+              </a:ext>
+            </a:extLst>
+          </a:blip>
+          <a:stretch>
+            <a:fillRect/>
+          </a:stretch>
+        </p:blipFill>
+        <p:spPr>
+          <a:xfrm>
+            <a:off x="7125970" y="0"/>
+            <a:ext cx="5066030" cy="2665148"/>
+          </a:xfrm>
+          <a:prstGeom prst="rect">
+            <a:avLst/>
+          </a:prstGeom>
+        </p:spPr>
+      </p:pic>
+      <p:pic>
+        <p:nvPicPr>
+          <p:cNvPr id="9" name="Picture 8">
+            <a:extLst>
+              <a:ext uri="{FF2B5EF4-FFF2-40B4-BE49-F238E27FC236}">
+                <a16:creationId xmlns:a16="http://schemas.microsoft.com/office/drawing/2014/main" id="{8EDE5F51-06CD-8247-A611-1C0B3AFDB335}"/>
+              </a:ext>
+            </a:extLst>
+          </p:cNvPr>
+          <p:cNvPicPr>
+            <a:picLocks noChangeAspect="1"/>
+          </p:cNvPicPr>
+          <p:nvPr/>
+        </p:nvPicPr>
+        <p:blipFill>
+          <a:blip r:embed="rId3">
+            <a:extLst>
+              <a:ext uri="{28A0092B-C50C-407E-A947-70E740481C1C}">
+                <a14:useLocalDpi xmlns:a14="http://schemas.microsoft.com/office/drawing/2010/main" val="0"/>
+              </a:ext>
+            </a:extLst>
+          </a:blip>
+          <a:stretch>
+            <a:fillRect/>
+          </a:stretch>
+        </p:blipFill>
+        <p:spPr>
+          <a:xfrm>
+            <a:off x="7125970" y="2665148"/>
+            <a:ext cx="5066030" cy="2619021"/>
+          </a:xfrm>
+          <a:prstGeom prst="rect">
+            <a:avLst/>
+          </a:prstGeom>
+        </p:spPr>
+      </p:pic>
+      <p:pic>
+        <p:nvPicPr>
+          <p:cNvPr id="11" name="Picture 10">
+            <a:extLst>
+              <a:ext uri="{FF2B5EF4-FFF2-40B4-BE49-F238E27FC236}">
+                <a16:creationId xmlns:a16="http://schemas.microsoft.com/office/drawing/2014/main" id="{D05CB218-7E69-9045-AAA8-4F2BCF82CF42}"/>
+              </a:ext>
+            </a:extLst>
+          </p:cNvPr>
+          <p:cNvPicPr>
+            <a:picLocks noChangeAspect="1"/>
+          </p:cNvPicPr>
+          <p:nvPr/>
+        </p:nvPicPr>
+        <p:blipFill>
+          <a:blip r:embed="rId4">
+            <a:extLst>
+              <a:ext uri="{28A0092B-C50C-407E-A947-70E740481C1C}">
+                <a14:useLocalDpi xmlns:a14="http://schemas.microsoft.com/office/drawing/2010/main" val="0"/>
+              </a:ext>
+            </a:extLst>
+          </a:blip>
+          <a:stretch>
+            <a:fillRect/>
+          </a:stretch>
+        </p:blipFill>
+        <p:spPr>
+          <a:xfrm>
+            <a:off x="7125969" y="5280998"/>
+            <a:ext cx="5060603" cy="2819400"/>
+          </a:xfrm>
+          <a:prstGeom prst="rect">
+            <a:avLst/>
+          </a:prstGeom>
+        </p:spPr>
+      </p:pic>
+      <p:pic>
+        <p:nvPicPr>
+          <p:cNvPr id="13" name="Picture 12">
+            <a:extLst>
+              <a:ext uri="{FF2B5EF4-FFF2-40B4-BE49-F238E27FC236}">
+                <a16:creationId xmlns:a16="http://schemas.microsoft.com/office/drawing/2014/main" id="{F8F7752A-CC91-C546-B1DA-CAFD7156C048}"/>
+              </a:ext>
+            </a:extLst>
+          </p:cNvPr>
+          <p:cNvPicPr>
+            <a:picLocks noChangeAspect="1"/>
+          </p:cNvPicPr>
+          <p:nvPr/>
+        </p:nvPicPr>
+        <p:blipFill>
+          <a:blip r:embed="rId5">
+            <a:extLst>
+              <a:ext uri="{28A0092B-C50C-407E-A947-70E740481C1C}">
+                <a14:useLocalDpi xmlns:a14="http://schemas.microsoft.com/office/drawing/2010/main" val="0"/>
+              </a:ext>
+            </a:extLst>
+          </a:blip>
+          <a:stretch>
+            <a:fillRect/>
+          </a:stretch>
+        </p:blipFill>
+        <p:spPr>
+          <a:xfrm>
+            <a:off x="0" y="3416320"/>
+            <a:ext cx="5060603" cy="2635843"/>
+          </a:xfrm>
+          <a:prstGeom prst="rect">
+            <a:avLst/>
+          </a:prstGeom>
+        </p:spPr>
+      </p:pic>
+      <p:pic>
+        <p:nvPicPr>
+          <p:cNvPr id="15" name="Picture 14">
+            <a:extLst>
+              <a:ext uri="{FF2B5EF4-FFF2-40B4-BE49-F238E27FC236}">
+                <a16:creationId xmlns:a16="http://schemas.microsoft.com/office/drawing/2014/main" id="{DD71307A-1B24-BA4C-8EBF-A1E7297BE5D2}"/>
+              </a:ext>
+            </a:extLst>
+          </p:cNvPr>
+          <p:cNvPicPr>
+            <a:picLocks noChangeAspect="1"/>
+          </p:cNvPicPr>
+          <p:nvPr/>
+        </p:nvPicPr>
+        <p:blipFill>
+          <a:blip r:embed="rId6">
+            <a:extLst>
+              <a:ext uri="{28A0092B-C50C-407E-A947-70E740481C1C}">
+                <a14:useLocalDpi xmlns:a14="http://schemas.microsoft.com/office/drawing/2010/main" val="0"/>
+              </a:ext>
+            </a:extLst>
+          </a:blip>
+          <a:stretch>
+            <a:fillRect/>
+          </a:stretch>
+        </p:blipFill>
+        <p:spPr>
+          <a:xfrm>
+            <a:off x="0" y="6052163"/>
+            <a:ext cx="5066030" cy="2589185"/>
+          </a:xfrm>
+          <a:prstGeom prst="rect">
+            <a:avLst/>
+          </a:prstGeom>
+        </p:spPr>
+      </p:pic>
+    </p:spTree>
+    <p:extLst>
+      <p:ext uri="{BB962C8B-B14F-4D97-AF65-F5344CB8AC3E}">
+        <p14:creationId xmlns:p14="http://schemas.microsoft.com/office/powerpoint/2010/main" val="3183743491"/>
+      </p:ext>
+    </p:extLst>
+  </p:cSld>
+  <p:clrMapOvr>
+    <a:masterClrMapping/>
+  </p:clrMapOvr>
+</p:sld>
+</file>
+
+<file path=ppt/slides/slide14.xml><?xml version="1.0" encoding="utf-8"?>
+<p:sld xmlns:a="http://schemas.openxmlformats.org/drawingml/2006/main" xmlns:r="http://schemas.openxmlformats.org/officeDocument/2006/relationships" xmlns:p="http://schemas.openxmlformats.org/presentationml/2006/main">
+  <p:cSld>
+    <p:spTree>
+      <p:nvGrpSpPr>
+        <p:cNvPr id="1" name=""/>
+        <p:cNvGrpSpPr/>
+        <p:nvPr/>
+      </p:nvGrpSpPr>
+      <p:grpSpPr>
+        <a:xfrm>
+          <a:off x="0" y="0"/>
+          <a:ext cx="0" cy="0"/>
+          <a:chOff x="0" y="0"/>
+          <a:chExt cx="0" cy="0"/>
+        </a:xfrm>
+      </p:grpSpPr>
+      <p:pic>
+        <p:nvPicPr>
+          <p:cNvPr id="5" name="Picture 4">
+            <a:extLst>
+              <a:ext uri="{FF2B5EF4-FFF2-40B4-BE49-F238E27FC236}">
+                <a16:creationId xmlns:a16="http://schemas.microsoft.com/office/drawing/2014/main" id="{FC63D036-0352-0E45-AA81-9739E8E255B7}"/>
+              </a:ext>
+            </a:extLst>
+          </p:cNvPr>
+          <p:cNvPicPr>
+            <a:picLocks noChangeAspect="1"/>
+          </p:cNvPicPr>
+          <p:nvPr/>
+        </p:nvPicPr>
+        <p:blipFill>
+          <a:blip r:embed="rId2">
+            <a:extLst>
+              <a:ext uri="{28A0092B-C50C-407E-A947-70E740481C1C}">
+                <a14:useLocalDpi xmlns:a14="http://schemas.microsoft.com/office/drawing/2010/main" val="0"/>
+              </a:ext>
+            </a:extLst>
+          </a:blip>
+          <a:stretch>
+            <a:fillRect/>
+          </a:stretch>
+        </p:blipFill>
+        <p:spPr>
+          <a:xfrm>
+            <a:off x="5163015" y="0"/>
+            <a:ext cx="7028985" cy="3797085"/>
+          </a:xfrm>
+          <a:prstGeom prst="rect">
+            <a:avLst/>
+          </a:prstGeom>
+        </p:spPr>
+      </p:pic>
+      <p:sp>
+        <p:nvSpPr>
+          <p:cNvPr id="6" name="TextBox 5">
+            <a:extLst>
+              <a:ext uri="{FF2B5EF4-FFF2-40B4-BE49-F238E27FC236}">
+                <a16:creationId xmlns:a16="http://schemas.microsoft.com/office/drawing/2014/main" id="{2B231928-1FEF-8C49-B626-AB325A0A24CC}"/>
+              </a:ext>
+            </a:extLst>
+          </p:cNvPr>
+          <p:cNvSpPr txBox="1"/>
+          <p:nvPr/>
+        </p:nvSpPr>
+        <p:spPr>
+          <a:xfrm>
+            <a:off x="-1" y="0"/>
+            <a:ext cx="5163015" cy="1754326"/>
+          </a:xfrm>
+          <a:prstGeom prst="rect">
+            <a:avLst/>
+          </a:prstGeom>
+          <a:noFill/>
+        </p:spPr>
+        <p:txBody>
+          <a:bodyPr wrap="square" rtlCol="0">
+            <a:spAutoFit/>
+          </a:bodyPr>
+          <a:lstStyle/>
+          <a:p>
+            <a:r>
+              <a:rPr lang="en-US" dirty="0"/>
+              <a:t>GCP</a:t>
+            </a:r>
+            <a:r>
+              <a:rPr lang="ja-JP" altLang="en-US"/>
+              <a:t>提供的几种计算</a:t>
+            </a:r>
+            <a:r>
+              <a:rPr lang="en-US" altLang="ja-JP" dirty="0"/>
+              <a:t>entity</a:t>
+            </a:r>
+            <a:r>
+              <a:rPr lang="zh-Hans" altLang="en-US" dirty="0"/>
+              <a:t>，</a:t>
+            </a:r>
+            <a:r>
+              <a:rPr lang="ja-JP" altLang="en-US"/>
+              <a:t>以及其</a:t>
+            </a:r>
+            <a:r>
+              <a:rPr lang="en-US" altLang="ja-JP" dirty="0"/>
+              <a:t>attributes</a:t>
+            </a:r>
+          </a:p>
+          <a:p>
+            <a:pPr marL="285750" indent="-285750">
+              <a:buFont typeface="Arial" panose="020B0604020202020204" pitchFamily="34" charset="0"/>
+              <a:buChar char="•"/>
+            </a:pPr>
+            <a:r>
+              <a:rPr lang="ja-JP" altLang="en-US"/>
+              <a:t>这个</a:t>
+            </a:r>
+            <a:r>
+              <a:rPr lang="en-US" altLang="ja-JP" dirty="0"/>
+              <a:t>slide</a:t>
+            </a:r>
+            <a:r>
+              <a:rPr lang="ja-JP" altLang="en-US"/>
+              <a:t>先着重看</a:t>
+            </a:r>
+            <a:r>
+              <a:rPr lang="en-US" altLang="ja-JP" dirty="0"/>
+              <a:t>Compute</a:t>
+            </a:r>
+            <a:r>
+              <a:rPr lang="zh-Hans" altLang="en-US" dirty="0"/>
+              <a:t> </a:t>
+            </a:r>
+            <a:r>
+              <a:rPr lang="en-US" altLang="zh-Hans" dirty="0"/>
+              <a:t>Engine</a:t>
+            </a:r>
+            <a:r>
+              <a:rPr lang="zh-Hans" altLang="en-US" dirty="0"/>
+              <a:t>（</a:t>
+            </a:r>
+            <a:r>
+              <a:rPr lang="en-US" altLang="zh-Hans" dirty="0"/>
+              <a:t>VM</a:t>
+            </a:r>
+            <a:r>
+              <a:rPr lang="zh-Hans" altLang="en-US" dirty="0"/>
+              <a:t>）</a:t>
+            </a:r>
+            <a:endParaRPr lang="en-US" altLang="zh-Hans" dirty="0"/>
+          </a:p>
+          <a:p>
+            <a:pPr marL="742950" lvl="1" indent="-285750">
+              <a:buFont typeface="Arial" panose="020B0604020202020204" pitchFamily="34" charset="0"/>
+              <a:buChar char="•"/>
+            </a:pPr>
+            <a:r>
+              <a:rPr lang="en-US" altLang="zh-Hans" dirty="0"/>
+              <a:t>VM</a:t>
+            </a:r>
+            <a:r>
+              <a:rPr lang="zh-Hans" altLang="en-US" dirty="0"/>
+              <a:t> </a:t>
+            </a:r>
+            <a:r>
+              <a:rPr lang="en-US" altLang="zh-Hans" dirty="0"/>
+              <a:t>lifecycle</a:t>
+            </a:r>
+            <a:r>
+              <a:rPr lang="ja-JP" altLang="en-US"/>
+              <a:t>见下图</a:t>
+            </a:r>
+            <a:endParaRPr lang="en-US" altLang="ja-JP" dirty="0"/>
+          </a:p>
+          <a:p>
+            <a:pPr marL="742950" lvl="1" indent="-285750">
+              <a:buFont typeface="Arial" panose="020B0604020202020204" pitchFamily="34" charset="0"/>
+              <a:buChar char="•"/>
+            </a:pPr>
+            <a:r>
+              <a:rPr lang="en-US" altLang="ja-JP" dirty="0" err="1"/>
+              <a:t>Vm</a:t>
+            </a:r>
+            <a:r>
+              <a:rPr lang="ja-JP" altLang="en-US"/>
+              <a:t>硬件</a:t>
+            </a:r>
+            <a:r>
+              <a:rPr lang="en-US" altLang="ja-JP" dirty="0"/>
+              <a:t>config</a:t>
+            </a:r>
+            <a:r>
+              <a:rPr lang="ja-JP" altLang="en-US"/>
+              <a:t>中有</a:t>
+            </a:r>
+            <a:r>
+              <a:rPr lang="en-US" altLang="ja-JP" dirty="0"/>
+              <a:t>vCPU ;</a:t>
+            </a:r>
+            <a:r>
+              <a:rPr lang="zh-Hans" altLang="en-US" dirty="0"/>
+              <a:t> </a:t>
+            </a:r>
+            <a:r>
+              <a:rPr lang="en-US" altLang="zh-Hans" dirty="0"/>
+              <a:t>disk</a:t>
+            </a:r>
+            <a:r>
+              <a:rPr lang="ja-JP" altLang="en-US"/>
+              <a:t>的选项有</a:t>
+            </a:r>
+            <a:r>
+              <a:rPr lang="en-US" altLang="ja-JP" dirty="0"/>
+              <a:t>standard</a:t>
+            </a:r>
+            <a:r>
+              <a:rPr lang="zh-Hans" altLang="en-US" dirty="0"/>
+              <a:t>，</a:t>
+            </a:r>
+            <a:r>
+              <a:rPr lang="en-US" altLang="zh-Hans" dirty="0"/>
+              <a:t>SSD</a:t>
+            </a:r>
+            <a:r>
+              <a:rPr lang="ja-JP" altLang="en-US"/>
+              <a:t>和</a:t>
+            </a:r>
+            <a:r>
+              <a:rPr lang="en-US" altLang="ja-JP" dirty="0"/>
+              <a:t>local</a:t>
+            </a:r>
+            <a:r>
+              <a:rPr lang="zh-Hans" altLang="en-US" dirty="0"/>
+              <a:t> </a:t>
+            </a:r>
+            <a:r>
+              <a:rPr lang="en-US" altLang="zh-Hans" dirty="0"/>
+              <a:t>SSD</a:t>
+            </a:r>
+            <a:r>
+              <a:rPr lang="zh-Hans" altLang="en-US" dirty="0"/>
+              <a:t>，</a:t>
+            </a:r>
+            <a:r>
+              <a:rPr lang="ja-JP" altLang="en-US"/>
+              <a:t>其中</a:t>
+            </a:r>
+            <a:r>
+              <a:rPr lang="en-US" altLang="ja-JP" dirty="0"/>
+              <a:t>local</a:t>
+            </a:r>
+            <a:r>
+              <a:rPr lang="zh-Hans" altLang="en-US" dirty="0"/>
+              <a:t> </a:t>
+            </a:r>
+            <a:r>
+              <a:rPr lang="en-US" altLang="zh-Hans" dirty="0"/>
+              <a:t>SSD</a:t>
+            </a:r>
+            <a:r>
+              <a:rPr lang="ja-JP" altLang="en-US"/>
+              <a:t>一般用于暂时的</a:t>
+            </a:r>
+            <a:r>
+              <a:rPr lang="en-US" altLang="ja-JP" dirty="0"/>
+              <a:t>data</a:t>
+            </a:r>
+            <a:r>
+              <a:rPr lang="zh-Hans" altLang="en-US" dirty="0"/>
+              <a:t> </a:t>
+            </a:r>
+            <a:r>
+              <a:rPr lang="en-US" altLang="zh-Hans" dirty="0"/>
+              <a:t>transfer</a:t>
+            </a:r>
+            <a:endParaRPr lang="en-US" dirty="0"/>
+          </a:p>
+        </p:txBody>
+      </p:sp>
+      <p:pic>
+        <p:nvPicPr>
+          <p:cNvPr id="8" name="Picture 7">
+            <a:extLst>
+              <a:ext uri="{FF2B5EF4-FFF2-40B4-BE49-F238E27FC236}">
+                <a16:creationId xmlns:a16="http://schemas.microsoft.com/office/drawing/2014/main" id="{5B33F7A7-4193-B74B-BABD-A9249C7308AC}"/>
+              </a:ext>
+            </a:extLst>
+          </p:cNvPr>
+          <p:cNvPicPr>
+            <a:picLocks noChangeAspect="1"/>
+          </p:cNvPicPr>
+          <p:nvPr/>
+        </p:nvPicPr>
+        <p:blipFill>
+          <a:blip r:embed="rId3">
+            <a:extLst>
+              <a:ext uri="{28A0092B-C50C-407E-A947-70E740481C1C}">
+                <a14:useLocalDpi xmlns:a14="http://schemas.microsoft.com/office/drawing/2010/main" val="0"/>
+              </a:ext>
+            </a:extLst>
+          </a:blip>
+          <a:stretch>
+            <a:fillRect/>
+          </a:stretch>
+        </p:blipFill>
+        <p:spPr>
+          <a:xfrm>
+            <a:off x="5166235" y="3797085"/>
+            <a:ext cx="7025765" cy="3869151"/>
+          </a:xfrm>
+          <a:prstGeom prst="rect">
+            <a:avLst/>
+          </a:prstGeom>
+        </p:spPr>
+      </p:pic>
+    </p:spTree>
+    <p:extLst>
+      <p:ext uri="{BB962C8B-B14F-4D97-AF65-F5344CB8AC3E}">
+        <p14:creationId xmlns:p14="http://schemas.microsoft.com/office/powerpoint/2010/main" val="540578599"/>
+      </p:ext>
+    </p:extLst>
+  </p:cSld>
+  <p:clrMapOvr>
+    <a:masterClrMapping/>
+  </p:clrMapOvr>
+</p:sld>
+</file>
+
+<file path=ppt/slides/slide15.xml><?xml version="1.0" encoding="utf-8"?>
 <p:sld xmlns:a="http://schemas.openxmlformats.org/drawingml/2006/main" xmlns:r="http://schemas.openxmlformats.org/officeDocument/2006/relationships" xmlns:p="http://schemas.openxmlformats.org/presentationml/2006/main">
   <p:cSld>
     <p:spTree>

</xml_diff>